<commit_message>
Added bonus assignments and user interface links to assignment.md and small background change to presentation
</commit_message>
<xml_diff>
--- a/documentation/backendworkshop.pptx
+++ b/documentation/backendworkshop.pptx
@@ -291,7 +291,7 @@
           <a:p>
             <a:fld id="{B8F827AF-F1B2-4FE1-8298-336C4F02AADF}" type="datetimeFigureOut">
               <a:rPr lang="nl-NL" smtClean="0"/>
-              <a:t>13-11-2020</a:t>
+              <a:t>27-11-2020</a:t>
             </a:fld>
             <a:endParaRPr lang="nl-NL"/>
           </a:p>
@@ -461,7 +461,7 @@
           <a:p>
             <a:fld id="{B8F827AF-F1B2-4FE1-8298-336C4F02AADF}" type="datetimeFigureOut">
               <a:rPr lang="nl-NL" smtClean="0"/>
-              <a:t>13-11-2020</a:t>
+              <a:t>27-11-2020</a:t>
             </a:fld>
             <a:endParaRPr lang="nl-NL"/>
           </a:p>
@@ -641,7 +641,7 @@
           <a:p>
             <a:fld id="{B8F827AF-F1B2-4FE1-8298-336C4F02AADF}" type="datetimeFigureOut">
               <a:rPr lang="nl-NL" smtClean="0"/>
-              <a:t>13-11-2020</a:t>
+              <a:t>27-11-2020</a:t>
             </a:fld>
             <a:endParaRPr lang="nl-NL"/>
           </a:p>
@@ -811,7 +811,7 @@
           <a:p>
             <a:fld id="{B8F827AF-F1B2-4FE1-8298-336C4F02AADF}" type="datetimeFigureOut">
               <a:rPr lang="nl-NL" smtClean="0"/>
-              <a:t>13-11-2020</a:t>
+              <a:t>27-11-2020</a:t>
             </a:fld>
             <a:endParaRPr lang="nl-NL"/>
           </a:p>
@@ -1057,7 +1057,7 @@
           <a:p>
             <a:fld id="{B8F827AF-F1B2-4FE1-8298-336C4F02AADF}" type="datetimeFigureOut">
               <a:rPr lang="nl-NL" smtClean="0"/>
-              <a:t>13-11-2020</a:t>
+              <a:t>27-11-2020</a:t>
             </a:fld>
             <a:endParaRPr lang="nl-NL"/>
           </a:p>
@@ -1289,7 +1289,7 @@
           <a:p>
             <a:fld id="{B8F827AF-F1B2-4FE1-8298-336C4F02AADF}" type="datetimeFigureOut">
               <a:rPr lang="nl-NL" smtClean="0"/>
-              <a:t>13-11-2020</a:t>
+              <a:t>27-11-2020</a:t>
             </a:fld>
             <a:endParaRPr lang="nl-NL"/>
           </a:p>
@@ -1656,7 +1656,7 @@
           <a:p>
             <a:fld id="{B8F827AF-F1B2-4FE1-8298-336C4F02AADF}" type="datetimeFigureOut">
               <a:rPr lang="nl-NL" smtClean="0"/>
-              <a:t>13-11-2020</a:t>
+              <a:t>27-11-2020</a:t>
             </a:fld>
             <a:endParaRPr lang="nl-NL"/>
           </a:p>
@@ -1774,7 +1774,7 @@
           <a:p>
             <a:fld id="{B8F827AF-F1B2-4FE1-8298-336C4F02AADF}" type="datetimeFigureOut">
               <a:rPr lang="nl-NL" smtClean="0"/>
-              <a:t>13-11-2020</a:t>
+              <a:t>27-11-2020</a:t>
             </a:fld>
             <a:endParaRPr lang="nl-NL"/>
           </a:p>
@@ -1869,7 +1869,7 @@
           <a:p>
             <a:fld id="{B8F827AF-F1B2-4FE1-8298-336C4F02AADF}" type="datetimeFigureOut">
               <a:rPr lang="nl-NL" smtClean="0"/>
-              <a:t>13-11-2020</a:t>
+              <a:t>27-11-2020</a:t>
             </a:fld>
             <a:endParaRPr lang="nl-NL"/>
           </a:p>
@@ -2146,7 +2146,7 @@
           <a:p>
             <a:fld id="{B8F827AF-F1B2-4FE1-8298-336C4F02AADF}" type="datetimeFigureOut">
               <a:rPr lang="nl-NL" smtClean="0"/>
-              <a:t>13-11-2020</a:t>
+              <a:t>27-11-2020</a:t>
             </a:fld>
             <a:endParaRPr lang="nl-NL"/>
           </a:p>
@@ -2403,7 +2403,7 @@
           <a:p>
             <a:fld id="{B8F827AF-F1B2-4FE1-8298-336C4F02AADF}" type="datetimeFigureOut">
               <a:rPr lang="nl-NL" smtClean="0"/>
-              <a:t>13-11-2020</a:t>
+              <a:t>27-11-2020</a:t>
             </a:fld>
             <a:endParaRPr lang="nl-NL"/>
           </a:p>
@@ -2616,7 +2616,7 @@
           <a:p>
             <a:fld id="{B8F827AF-F1B2-4FE1-8298-336C4F02AADF}" type="datetimeFigureOut">
               <a:rPr lang="nl-NL" smtClean="0"/>
-              <a:t>13-11-2020</a:t>
+              <a:t>27-11-2020</a:t>
             </a:fld>
             <a:endParaRPr lang="nl-NL"/>
           </a:p>
@@ -6399,7 +6399,7 @@
                 <a:latin typeface="Courier New" panose="02070309020205020404" pitchFamily="49" charset="0"/>
                 <a:cs typeface="Courier New" panose="02070309020205020404" pitchFamily="49" charset="0"/>
               </a:rPr>
-              <a:t> String message;</a:t>
+              <a:t>String message;</a:t>
             </a:r>
             <a:endParaRPr kumimoji="0" lang="nl-NL" altLang="nl-NL" sz="1100" b="0" i="0" u="none" strike="noStrike" cap="none" normalizeH="0" baseline="0" dirty="0">
               <a:ln>
@@ -6444,27 +6444,6 @@
             <a:noFill/>
           </a:ln>
           <a:effectLst/>
-          <a:extLst>
-            <a:ext uri="{91240B29-F687-4F45-9708-019B960494DF}">
-              <a14:hiddenLine xmlns:a14="http://schemas.microsoft.com/office/drawing/2010/main" w="9525">
-                <a:solidFill>
-                  <a:schemeClr val="tx1"/>
-                </a:solidFill>
-                <a:miter lim="800000"/>
-                <a:headEnd/>
-                <a:tailEnd/>
-              </a14:hiddenLine>
-            </a:ext>
-            <a:ext uri="{AF507438-7753-43E0-B8FC-AC1667EBCBE1}">
-              <a14:hiddenEffects xmlns:a14="http://schemas.microsoft.com/office/drawing/2010/main">
-                <a:effectLst>
-                  <a:outerShdw dist="35921" dir="2700000" algn="ctr" rotWithShape="0">
-                    <a:schemeClr val="bg2"/>
-                  </a:outerShdw>
-                </a:effectLst>
-              </a14:hiddenEffects>
-            </a:ext>
-          </a:extLst>
         </p:spPr>
         <p:txBody>
           <a:bodyPr vert="horz" wrap="square" lIns="91440" tIns="45720" rIns="91440" bIns="45720" numCol="1" anchor="ctr" anchorCtr="0" compatLnSpc="1">
@@ -6626,7 +6605,7 @@
             <a:avLst/>
           </a:prstGeom>
           <a:solidFill>
-            <a:schemeClr val="tx1"/>
+            <a:srgbClr val="282A36"/>
           </a:solidFill>
           <a:ln>
             <a:noFill/>

</xml_diff>